<commit_message>
Updates to Writing Assignment
</commit_message>
<xml_diff>
--- a/Writing Assignments/Preliminary Research Presentation.pptx
+++ b/Writing Assignments/Preliminary Research Presentation.pptx
@@ -228,7 +228,7 @@
           <a:p>
             <a:fld id="{59041DB8-B66F-4DC8-A96E-33677E0F90FF}" type="datetimeFigureOut">
               <a:rPr lang="en-US" smtClean="0"/>
-              <a:t>2/18/19</a:t>
+              <a:t>2/18/2019</a:t>
             </a:fld>
             <a:endParaRPr lang="en-US"/>
           </a:p>
@@ -393,7 +393,7 @@
           <a:p>
             <a:fld id="{DEB49C4A-65AC-492D-9701-81B46C3AD0E4}" type="datetimeFigureOut">
               <a:rPr lang="en-US" smtClean="0"/>
-              <a:t>2/18/19</a:t>
+              <a:t>2/18/2019</a:t>
             </a:fld>
             <a:endParaRPr lang="en-US"/>
           </a:p>
@@ -658,6 +658,1106 @@
     </a:lvl9pPr>
   </p:notesStyle>
 </p:notesMaster>
+</file>
+
+<file path=ppt/notesSlides/notesSlide1.xml><?xml version="1.0" encoding="utf-8"?>
+<p:notes xmlns:a="http://schemas.openxmlformats.org/drawingml/2006/main" xmlns:r="http://schemas.openxmlformats.org/officeDocument/2006/relationships" xmlns:p="http://schemas.openxmlformats.org/presentationml/2006/main">
+  <p:cSld>
+    <p:spTree>
+      <p:nvGrpSpPr>
+        <p:cNvPr id="1" name=""/>
+        <p:cNvGrpSpPr/>
+        <p:nvPr/>
+      </p:nvGrpSpPr>
+      <p:grpSpPr>
+        <a:xfrm>
+          <a:off x="0" y="0"/>
+          <a:ext cx="0" cy="0"/>
+          <a:chOff x="0" y="0"/>
+          <a:chExt cx="0" cy="0"/>
+        </a:xfrm>
+      </p:grpSpPr>
+      <p:sp>
+        <p:nvSpPr>
+          <p:cNvPr id="2" name="Slide Image Placeholder 1"/>
+          <p:cNvSpPr>
+            <a:spLocks noGrp="1" noRot="1" noChangeAspect="1"/>
+          </p:cNvSpPr>
+          <p:nvPr>
+            <p:ph type="sldImg"/>
+          </p:nvPr>
+        </p:nvSpPr>
+        <p:spPr/>
+      </p:sp>
+      <p:sp>
+        <p:nvSpPr>
+          <p:cNvPr id="3" name="Notes Placeholder 2"/>
+          <p:cNvSpPr>
+            <a:spLocks noGrp="1"/>
+          </p:cNvSpPr>
+          <p:nvPr>
+            <p:ph type="body" idx="1"/>
+          </p:nvPr>
+        </p:nvSpPr>
+        <p:spPr/>
+        <p:txBody>
+          <a:bodyPr/>
+          <a:lstStyle/>
+          <a:p>
+            <a:r>
+              <a:rPr lang="en-US" dirty="0"/>
+              <a:t>-Kai</a:t>
+            </a:r>
+          </a:p>
+          <a:p>
+            <a:r>
+              <a:rPr lang="en-US" dirty="0"/>
+              <a:t>-Risk Aversion: Willingness to take risk, the higher the number the less risk you want to take on. </a:t>
+            </a:r>
+          </a:p>
+        </p:txBody>
+      </p:sp>
+      <p:sp>
+        <p:nvSpPr>
+          <p:cNvPr id="4" name="Slide Number Placeholder 3"/>
+          <p:cNvSpPr>
+            <a:spLocks noGrp="1"/>
+          </p:cNvSpPr>
+          <p:nvPr>
+            <p:ph type="sldNum" sz="quarter" idx="5"/>
+          </p:nvPr>
+        </p:nvSpPr>
+        <p:spPr/>
+        <p:txBody>
+          <a:bodyPr/>
+          <a:lstStyle/>
+          <a:p>
+            <a:fld id="{82869989-EB00-4EE7-BCB5-25BDC5BB29F8}" type="slidenum">
+              <a:rPr lang="en-US" smtClean="0"/>
+              <a:t>3</a:t>
+            </a:fld>
+            <a:endParaRPr lang="en-US"/>
+          </a:p>
+        </p:txBody>
+      </p:sp>
+    </p:spTree>
+    <p:extLst>
+      <p:ext uri="{BB962C8B-B14F-4D97-AF65-F5344CB8AC3E}">
+        <p14:creationId xmlns:p14="http://schemas.microsoft.com/office/powerpoint/2010/main" val="705559023"/>
+      </p:ext>
+    </p:extLst>
+  </p:cSld>
+  <p:clrMapOvr>
+    <a:masterClrMapping/>
+  </p:clrMapOvr>
+</p:notes>
+</file>
+
+<file path=ppt/notesSlides/notesSlide10.xml><?xml version="1.0" encoding="utf-8"?>
+<p:notes xmlns:a="http://schemas.openxmlformats.org/drawingml/2006/main" xmlns:r="http://schemas.openxmlformats.org/officeDocument/2006/relationships" xmlns:p="http://schemas.openxmlformats.org/presentationml/2006/main">
+  <p:cSld>
+    <p:spTree>
+      <p:nvGrpSpPr>
+        <p:cNvPr id="1" name=""/>
+        <p:cNvGrpSpPr/>
+        <p:nvPr/>
+      </p:nvGrpSpPr>
+      <p:grpSpPr>
+        <a:xfrm>
+          <a:off x="0" y="0"/>
+          <a:ext cx="0" cy="0"/>
+          <a:chOff x="0" y="0"/>
+          <a:chExt cx="0" cy="0"/>
+        </a:xfrm>
+      </p:grpSpPr>
+      <p:sp>
+        <p:nvSpPr>
+          <p:cNvPr id="2" name="Slide Image Placeholder 1"/>
+          <p:cNvSpPr>
+            <a:spLocks noGrp="1" noRot="1" noChangeAspect="1"/>
+          </p:cNvSpPr>
+          <p:nvPr>
+            <p:ph type="sldImg"/>
+          </p:nvPr>
+        </p:nvSpPr>
+        <p:spPr/>
+      </p:sp>
+      <p:sp>
+        <p:nvSpPr>
+          <p:cNvPr id="3" name="Notes Placeholder 2"/>
+          <p:cNvSpPr>
+            <a:spLocks noGrp="1"/>
+          </p:cNvSpPr>
+          <p:nvPr>
+            <p:ph type="body" idx="1"/>
+          </p:nvPr>
+        </p:nvSpPr>
+        <p:spPr/>
+        <p:txBody>
+          <a:bodyPr/>
+          <a:lstStyle/>
+          <a:p>
+            <a:r>
+              <a:rPr lang="en-US" dirty="0"/>
+              <a:t>-Jenna</a:t>
+            </a:r>
+          </a:p>
+          <a:p>
+            <a:r>
+              <a:rPr lang="en-US" dirty="0"/>
+              <a:t>-Explain what an MV-DCC GARCH model is</a:t>
+            </a:r>
+          </a:p>
+          <a:p>
+            <a:endParaRPr lang="en-US" dirty="0"/>
+          </a:p>
+          <a:p>
+            <a:r>
+              <a:rPr lang="en-US" dirty="0"/>
+              <a:t>Finding volatility or return spillover effects.</a:t>
+            </a:r>
+          </a:p>
+        </p:txBody>
+      </p:sp>
+      <p:sp>
+        <p:nvSpPr>
+          <p:cNvPr id="4" name="Slide Number Placeholder 3"/>
+          <p:cNvSpPr>
+            <a:spLocks noGrp="1"/>
+          </p:cNvSpPr>
+          <p:nvPr>
+            <p:ph type="sldNum" sz="quarter" idx="5"/>
+          </p:nvPr>
+        </p:nvSpPr>
+        <p:spPr/>
+        <p:txBody>
+          <a:bodyPr/>
+          <a:lstStyle/>
+          <a:p>
+            <a:fld id="{82869989-EB00-4EE7-BCB5-25BDC5BB29F8}" type="slidenum">
+              <a:rPr lang="en-US" smtClean="0"/>
+              <a:t>12</a:t>
+            </a:fld>
+            <a:endParaRPr lang="en-US"/>
+          </a:p>
+        </p:txBody>
+      </p:sp>
+    </p:spTree>
+    <p:extLst>
+      <p:ext uri="{BB962C8B-B14F-4D97-AF65-F5344CB8AC3E}">
+        <p14:creationId xmlns:p14="http://schemas.microsoft.com/office/powerpoint/2010/main" val="3523138942"/>
+      </p:ext>
+    </p:extLst>
+  </p:cSld>
+  <p:clrMapOvr>
+    <a:masterClrMapping/>
+  </p:clrMapOvr>
+</p:notes>
+</file>
+
+<file path=ppt/notesSlides/notesSlide11.xml><?xml version="1.0" encoding="utf-8"?>
+<p:notes xmlns:a="http://schemas.openxmlformats.org/drawingml/2006/main" xmlns:r="http://schemas.openxmlformats.org/officeDocument/2006/relationships" xmlns:p="http://schemas.openxmlformats.org/presentationml/2006/main">
+  <p:cSld>
+    <p:spTree>
+      <p:nvGrpSpPr>
+        <p:cNvPr id="1" name=""/>
+        <p:cNvGrpSpPr/>
+        <p:nvPr/>
+      </p:nvGrpSpPr>
+      <p:grpSpPr>
+        <a:xfrm>
+          <a:off x="0" y="0"/>
+          <a:ext cx="0" cy="0"/>
+          <a:chOff x="0" y="0"/>
+          <a:chExt cx="0" cy="0"/>
+        </a:xfrm>
+      </p:grpSpPr>
+      <p:sp>
+        <p:nvSpPr>
+          <p:cNvPr id="2" name="Slide Image Placeholder 1"/>
+          <p:cNvSpPr>
+            <a:spLocks noGrp="1" noRot="1" noChangeAspect="1"/>
+          </p:cNvSpPr>
+          <p:nvPr>
+            <p:ph type="sldImg"/>
+          </p:nvPr>
+        </p:nvSpPr>
+        <p:spPr/>
+      </p:sp>
+      <p:sp>
+        <p:nvSpPr>
+          <p:cNvPr id="3" name="Notes Placeholder 2"/>
+          <p:cNvSpPr>
+            <a:spLocks noGrp="1"/>
+          </p:cNvSpPr>
+          <p:nvPr>
+            <p:ph type="body" idx="1"/>
+          </p:nvPr>
+        </p:nvSpPr>
+        <p:spPr/>
+        <p:txBody>
+          <a:bodyPr/>
+          <a:lstStyle/>
+          <a:p>
+            <a:r>
+              <a:rPr lang="en-US" dirty="0"/>
+              <a:t>-Kai</a:t>
+            </a:r>
+          </a:p>
+          <a:p>
+            <a:r>
+              <a:rPr lang="en-US" dirty="0"/>
+              <a:t>-Explain why bitcoin is a useful portfolio diversifier (currency or asset)</a:t>
+            </a:r>
+          </a:p>
+        </p:txBody>
+      </p:sp>
+      <p:sp>
+        <p:nvSpPr>
+          <p:cNvPr id="4" name="Slide Number Placeholder 3"/>
+          <p:cNvSpPr>
+            <a:spLocks noGrp="1"/>
+          </p:cNvSpPr>
+          <p:nvPr>
+            <p:ph type="sldNum" sz="quarter" idx="5"/>
+          </p:nvPr>
+        </p:nvSpPr>
+        <p:spPr/>
+        <p:txBody>
+          <a:bodyPr/>
+          <a:lstStyle/>
+          <a:p>
+            <a:fld id="{82869989-EB00-4EE7-BCB5-25BDC5BB29F8}" type="slidenum">
+              <a:rPr lang="en-US" smtClean="0"/>
+              <a:t>13</a:t>
+            </a:fld>
+            <a:endParaRPr lang="en-US"/>
+          </a:p>
+        </p:txBody>
+      </p:sp>
+    </p:spTree>
+    <p:extLst>
+      <p:ext uri="{BB962C8B-B14F-4D97-AF65-F5344CB8AC3E}">
+        <p14:creationId xmlns:p14="http://schemas.microsoft.com/office/powerpoint/2010/main" val="316977420"/>
+      </p:ext>
+    </p:extLst>
+  </p:cSld>
+  <p:clrMapOvr>
+    <a:masterClrMapping/>
+  </p:clrMapOvr>
+</p:notes>
+</file>
+
+<file path=ppt/notesSlides/notesSlide12.xml><?xml version="1.0" encoding="utf-8"?>
+<p:notes xmlns:a="http://schemas.openxmlformats.org/drawingml/2006/main" xmlns:r="http://schemas.openxmlformats.org/officeDocument/2006/relationships" xmlns:p="http://schemas.openxmlformats.org/presentationml/2006/main">
+  <p:cSld>
+    <p:spTree>
+      <p:nvGrpSpPr>
+        <p:cNvPr id="1" name=""/>
+        <p:cNvGrpSpPr/>
+        <p:nvPr/>
+      </p:nvGrpSpPr>
+      <p:grpSpPr>
+        <a:xfrm>
+          <a:off x="0" y="0"/>
+          <a:ext cx="0" cy="0"/>
+          <a:chOff x="0" y="0"/>
+          <a:chExt cx="0" cy="0"/>
+        </a:xfrm>
+      </p:grpSpPr>
+      <p:sp>
+        <p:nvSpPr>
+          <p:cNvPr id="2" name="Slide Image Placeholder 1"/>
+          <p:cNvSpPr>
+            <a:spLocks noGrp="1" noRot="1" noChangeAspect="1"/>
+          </p:cNvSpPr>
+          <p:nvPr>
+            <p:ph type="sldImg"/>
+          </p:nvPr>
+        </p:nvSpPr>
+        <p:spPr/>
+      </p:sp>
+      <p:sp>
+        <p:nvSpPr>
+          <p:cNvPr id="3" name="Notes Placeholder 2"/>
+          <p:cNvSpPr>
+            <a:spLocks noGrp="1"/>
+          </p:cNvSpPr>
+          <p:nvPr>
+            <p:ph type="body" idx="1"/>
+          </p:nvPr>
+        </p:nvSpPr>
+        <p:spPr/>
+        <p:txBody>
+          <a:bodyPr/>
+          <a:lstStyle/>
+          <a:p>
+            <a:endParaRPr lang="en-US"/>
+          </a:p>
+        </p:txBody>
+      </p:sp>
+      <p:sp>
+        <p:nvSpPr>
+          <p:cNvPr id="4" name="Slide Number Placeholder 3"/>
+          <p:cNvSpPr>
+            <a:spLocks noGrp="1"/>
+          </p:cNvSpPr>
+          <p:nvPr>
+            <p:ph type="sldNum" sz="quarter" idx="5"/>
+          </p:nvPr>
+        </p:nvSpPr>
+        <p:spPr/>
+        <p:txBody>
+          <a:bodyPr/>
+          <a:lstStyle/>
+          <a:p>
+            <a:fld id="{82869989-EB00-4EE7-BCB5-25BDC5BB29F8}" type="slidenum">
+              <a:rPr lang="en-US" smtClean="0"/>
+              <a:t>14</a:t>
+            </a:fld>
+            <a:endParaRPr lang="en-US"/>
+          </a:p>
+        </p:txBody>
+      </p:sp>
+    </p:spTree>
+    <p:extLst>
+      <p:ext uri="{BB962C8B-B14F-4D97-AF65-F5344CB8AC3E}">
+        <p14:creationId xmlns:p14="http://schemas.microsoft.com/office/powerpoint/2010/main" val="3511918955"/>
+      </p:ext>
+    </p:extLst>
+  </p:cSld>
+  <p:clrMapOvr>
+    <a:masterClrMapping/>
+  </p:clrMapOvr>
+</p:notes>
+</file>
+
+<file path=ppt/notesSlides/notesSlide2.xml><?xml version="1.0" encoding="utf-8"?>
+<p:notes xmlns:a="http://schemas.openxmlformats.org/drawingml/2006/main" xmlns:r="http://schemas.openxmlformats.org/officeDocument/2006/relationships" xmlns:p="http://schemas.openxmlformats.org/presentationml/2006/main">
+  <p:cSld>
+    <p:spTree>
+      <p:nvGrpSpPr>
+        <p:cNvPr id="1" name=""/>
+        <p:cNvGrpSpPr/>
+        <p:nvPr/>
+      </p:nvGrpSpPr>
+      <p:grpSpPr>
+        <a:xfrm>
+          <a:off x="0" y="0"/>
+          <a:ext cx="0" cy="0"/>
+          <a:chOff x="0" y="0"/>
+          <a:chExt cx="0" cy="0"/>
+        </a:xfrm>
+      </p:grpSpPr>
+      <p:sp>
+        <p:nvSpPr>
+          <p:cNvPr id="2" name="Slide Image Placeholder 1"/>
+          <p:cNvSpPr>
+            <a:spLocks noGrp="1" noRot="1" noChangeAspect="1"/>
+          </p:cNvSpPr>
+          <p:nvPr>
+            <p:ph type="sldImg"/>
+          </p:nvPr>
+        </p:nvSpPr>
+        <p:spPr/>
+      </p:sp>
+      <p:sp>
+        <p:nvSpPr>
+          <p:cNvPr id="3" name="Notes Placeholder 2"/>
+          <p:cNvSpPr>
+            <a:spLocks noGrp="1"/>
+          </p:cNvSpPr>
+          <p:nvPr>
+            <p:ph type="body" idx="1"/>
+          </p:nvPr>
+        </p:nvSpPr>
+        <p:spPr/>
+        <p:txBody>
+          <a:bodyPr/>
+          <a:lstStyle/>
+          <a:p>
+            <a:r>
+              <a:rPr lang="en-US" dirty="0"/>
+              <a:t>-Kai</a:t>
+            </a:r>
+          </a:p>
+        </p:txBody>
+      </p:sp>
+      <p:sp>
+        <p:nvSpPr>
+          <p:cNvPr id="4" name="Slide Number Placeholder 3"/>
+          <p:cNvSpPr>
+            <a:spLocks noGrp="1"/>
+          </p:cNvSpPr>
+          <p:nvPr>
+            <p:ph type="sldNum" sz="quarter" idx="5"/>
+          </p:nvPr>
+        </p:nvSpPr>
+        <p:spPr/>
+        <p:txBody>
+          <a:bodyPr/>
+          <a:lstStyle/>
+          <a:p>
+            <a:fld id="{82869989-EB00-4EE7-BCB5-25BDC5BB29F8}" type="slidenum">
+              <a:rPr lang="en-US" smtClean="0"/>
+              <a:t>4</a:t>
+            </a:fld>
+            <a:endParaRPr lang="en-US"/>
+          </a:p>
+        </p:txBody>
+      </p:sp>
+    </p:spTree>
+    <p:extLst>
+      <p:ext uri="{BB962C8B-B14F-4D97-AF65-F5344CB8AC3E}">
+        <p14:creationId xmlns:p14="http://schemas.microsoft.com/office/powerpoint/2010/main" val="3517540531"/>
+      </p:ext>
+    </p:extLst>
+  </p:cSld>
+  <p:clrMapOvr>
+    <a:masterClrMapping/>
+  </p:clrMapOvr>
+</p:notes>
+</file>
+
+<file path=ppt/notesSlides/notesSlide3.xml><?xml version="1.0" encoding="utf-8"?>
+<p:notes xmlns:a="http://schemas.openxmlformats.org/drawingml/2006/main" xmlns:r="http://schemas.openxmlformats.org/officeDocument/2006/relationships" xmlns:p="http://schemas.openxmlformats.org/presentationml/2006/main">
+  <p:cSld>
+    <p:spTree>
+      <p:nvGrpSpPr>
+        <p:cNvPr id="1" name=""/>
+        <p:cNvGrpSpPr/>
+        <p:nvPr/>
+      </p:nvGrpSpPr>
+      <p:grpSpPr>
+        <a:xfrm>
+          <a:off x="0" y="0"/>
+          <a:ext cx="0" cy="0"/>
+          <a:chOff x="0" y="0"/>
+          <a:chExt cx="0" cy="0"/>
+        </a:xfrm>
+      </p:grpSpPr>
+      <p:sp>
+        <p:nvSpPr>
+          <p:cNvPr id="2" name="Slide Image Placeholder 1"/>
+          <p:cNvSpPr>
+            <a:spLocks noGrp="1" noRot="1" noChangeAspect="1"/>
+          </p:cNvSpPr>
+          <p:nvPr>
+            <p:ph type="sldImg"/>
+          </p:nvPr>
+        </p:nvSpPr>
+        <p:spPr/>
+      </p:sp>
+      <p:sp>
+        <p:nvSpPr>
+          <p:cNvPr id="3" name="Notes Placeholder 2"/>
+          <p:cNvSpPr>
+            <a:spLocks noGrp="1"/>
+          </p:cNvSpPr>
+          <p:nvPr>
+            <p:ph type="body" idx="1"/>
+          </p:nvPr>
+        </p:nvSpPr>
+        <p:spPr/>
+        <p:txBody>
+          <a:bodyPr/>
+          <a:lstStyle/>
+          <a:p>
+            <a:r>
+              <a:rPr lang="en-US" dirty="0"/>
+              <a:t>-Kai</a:t>
+            </a:r>
+          </a:p>
+        </p:txBody>
+      </p:sp>
+      <p:sp>
+        <p:nvSpPr>
+          <p:cNvPr id="4" name="Slide Number Placeholder 3"/>
+          <p:cNvSpPr>
+            <a:spLocks noGrp="1"/>
+          </p:cNvSpPr>
+          <p:nvPr>
+            <p:ph type="sldNum" sz="quarter" idx="5"/>
+          </p:nvPr>
+        </p:nvSpPr>
+        <p:spPr/>
+        <p:txBody>
+          <a:bodyPr/>
+          <a:lstStyle/>
+          <a:p>
+            <a:fld id="{82869989-EB00-4EE7-BCB5-25BDC5BB29F8}" type="slidenum">
+              <a:rPr lang="en-US" smtClean="0"/>
+              <a:t>5</a:t>
+            </a:fld>
+            <a:endParaRPr lang="en-US"/>
+          </a:p>
+        </p:txBody>
+      </p:sp>
+    </p:spTree>
+    <p:extLst>
+      <p:ext uri="{BB962C8B-B14F-4D97-AF65-F5344CB8AC3E}">
+        <p14:creationId xmlns:p14="http://schemas.microsoft.com/office/powerpoint/2010/main" val="3630648647"/>
+      </p:ext>
+    </p:extLst>
+  </p:cSld>
+  <p:clrMapOvr>
+    <a:masterClrMapping/>
+  </p:clrMapOvr>
+</p:notes>
+</file>
+
+<file path=ppt/notesSlides/notesSlide4.xml><?xml version="1.0" encoding="utf-8"?>
+<p:notes xmlns:a="http://schemas.openxmlformats.org/drawingml/2006/main" xmlns:r="http://schemas.openxmlformats.org/officeDocument/2006/relationships" xmlns:p="http://schemas.openxmlformats.org/presentationml/2006/main">
+  <p:cSld>
+    <p:spTree>
+      <p:nvGrpSpPr>
+        <p:cNvPr id="1" name=""/>
+        <p:cNvGrpSpPr/>
+        <p:nvPr/>
+      </p:nvGrpSpPr>
+      <p:grpSpPr>
+        <a:xfrm>
+          <a:off x="0" y="0"/>
+          <a:ext cx="0" cy="0"/>
+          <a:chOff x="0" y="0"/>
+          <a:chExt cx="0" cy="0"/>
+        </a:xfrm>
+      </p:grpSpPr>
+      <p:sp>
+        <p:nvSpPr>
+          <p:cNvPr id="2" name="Slide Image Placeholder 1"/>
+          <p:cNvSpPr>
+            <a:spLocks noGrp="1" noRot="1" noChangeAspect="1"/>
+          </p:cNvSpPr>
+          <p:nvPr>
+            <p:ph type="sldImg"/>
+          </p:nvPr>
+        </p:nvSpPr>
+        <p:spPr/>
+      </p:sp>
+      <p:sp>
+        <p:nvSpPr>
+          <p:cNvPr id="3" name="Notes Placeholder 2"/>
+          <p:cNvSpPr>
+            <a:spLocks noGrp="1"/>
+          </p:cNvSpPr>
+          <p:nvPr>
+            <p:ph type="body" idx="1"/>
+          </p:nvPr>
+        </p:nvSpPr>
+        <p:spPr/>
+        <p:txBody>
+          <a:bodyPr/>
+          <a:lstStyle/>
+          <a:p>
+            <a:r>
+              <a:rPr lang="en-US" dirty="0"/>
+              <a:t>-Kai</a:t>
+            </a:r>
+          </a:p>
+        </p:txBody>
+      </p:sp>
+      <p:sp>
+        <p:nvSpPr>
+          <p:cNvPr id="4" name="Slide Number Placeholder 3"/>
+          <p:cNvSpPr>
+            <a:spLocks noGrp="1"/>
+          </p:cNvSpPr>
+          <p:nvPr>
+            <p:ph type="sldNum" sz="quarter" idx="5"/>
+          </p:nvPr>
+        </p:nvSpPr>
+        <p:spPr/>
+        <p:txBody>
+          <a:bodyPr/>
+          <a:lstStyle/>
+          <a:p>
+            <a:fld id="{82869989-EB00-4EE7-BCB5-25BDC5BB29F8}" type="slidenum">
+              <a:rPr lang="en-US" smtClean="0"/>
+              <a:t>6</a:t>
+            </a:fld>
+            <a:endParaRPr lang="en-US"/>
+          </a:p>
+        </p:txBody>
+      </p:sp>
+    </p:spTree>
+    <p:extLst>
+      <p:ext uri="{BB962C8B-B14F-4D97-AF65-F5344CB8AC3E}">
+        <p14:creationId xmlns:p14="http://schemas.microsoft.com/office/powerpoint/2010/main" val="1362503696"/>
+      </p:ext>
+    </p:extLst>
+  </p:cSld>
+  <p:clrMapOvr>
+    <a:masterClrMapping/>
+  </p:clrMapOvr>
+</p:notes>
+</file>
+
+<file path=ppt/notesSlides/notesSlide5.xml><?xml version="1.0" encoding="utf-8"?>
+<p:notes xmlns:a="http://schemas.openxmlformats.org/drawingml/2006/main" xmlns:r="http://schemas.openxmlformats.org/officeDocument/2006/relationships" xmlns:p="http://schemas.openxmlformats.org/presentationml/2006/main">
+  <p:cSld>
+    <p:spTree>
+      <p:nvGrpSpPr>
+        <p:cNvPr id="1" name=""/>
+        <p:cNvGrpSpPr/>
+        <p:nvPr/>
+      </p:nvGrpSpPr>
+      <p:grpSpPr>
+        <a:xfrm>
+          <a:off x="0" y="0"/>
+          <a:ext cx="0" cy="0"/>
+          <a:chOff x="0" y="0"/>
+          <a:chExt cx="0" cy="0"/>
+        </a:xfrm>
+      </p:grpSpPr>
+      <p:sp>
+        <p:nvSpPr>
+          <p:cNvPr id="2" name="Slide Image Placeholder 1"/>
+          <p:cNvSpPr>
+            <a:spLocks noGrp="1" noRot="1" noChangeAspect="1"/>
+          </p:cNvSpPr>
+          <p:nvPr>
+            <p:ph type="sldImg"/>
+          </p:nvPr>
+        </p:nvSpPr>
+        <p:spPr/>
+      </p:sp>
+      <p:sp>
+        <p:nvSpPr>
+          <p:cNvPr id="3" name="Notes Placeholder 2"/>
+          <p:cNvSpPr>
+            <a:spLocks noGrp="1"/>
+          </p:cNvSpPr>
+          <p:nvPr>
+            <p:ph type="body" idx="1"/>
+          </p:nvPr>
+        </p:nvSpPr>
+        <p:spPr/>
+        <p:txBody>
+          <a:bodyPr/>
+          <a:lstStyle/>
+          <a:p>
+            <a:pPr marL="0" marR="0" lvl="0" indent="0" algn="l" defTabSz="914400" rtl="0" eaLnBrk="1" fontAlgn="auto" latinLnBrk="0" hangingPunct="1">
+              <a:lnSpc>
+                <a:spcPct val="100000"/>
+              </a:lnSpc>
+              <a:spcBef>
+                <a:spcPts val="0"/>
+              </a:spcBef>
+              <a:spcAft>
+                <a:spcPts val="0"/>
+              </a:spcAft>
+              <a:buClrTx/>
+              <a:buSzTx/>
+              <a:buFontTx/>
+              <a:buNone/>
+              <a:tabLst/>
+              <a:defRPr/>
+            </a:pPr>
+            <a:r>
+              <a:rPr lang="en-US" dirty="0"/>
+              <a:t>-Give Fruit Tree Analogy(Kai)</a:t>
+            </a:r>
+          </a:p>
+          <a:p>
+            <a:endParaRPr lang="en-US" dirty="0"/>
+          </a:p>
+        </p:txBody>
+      </p:sp>
+      <p:sp>
+        <p:nvSpPr>
+          <p:cNvPr id="4" name="Slide Number Placeholder 3"/>
+          <p:cNvSpPr>
+            <a:spLocks noGrp="1"/>
+          </p:cNvSpPr>
+          <p:nvPr>
+            <p:ph type="sldNum" sz="quarter" idx="5"/>
+          </p:nvPr>
+        </p:nvSpPr>
+        <p:spPr/>
+        <p:txBody>
+          <a:bodyPr/>
+          <a:lstStyle/>
+          <a:p>
+            <a:fld id="{82869989-EB00-4EE7-BCB5-25BDC5BB29F8}" type="slidenum">
+              <a:rPr lang="en-US" smtClean="0"/>
+              <a:t>7</a:t>
+            </a:fld>
+            <a:endParaRPr lang="en-US"/>
+          </a:p>
+        </p:txBody>
+      </p:sp>
+    </p:spTree>
+    <p:extLst>
+      <p:ext uri="{BB962C8B-B14F-4D97-AF65-F5344CB8AC3E}">
+        <p14:creationId xmlns:p14="http://schemas.microsoft.com/office/powerpoint/2010/main" val="2564837663"/>
+      </p:ext>
+    </p:extLst>
+  </p:cSld>
+  <p:clrMapOvr>
+    <a:masterClrMapping/>
+  </p:clrMapOvr>
+</p:notes>
+</file>
+
+<file path=ppt/notesSlides/notesSlide6.xml><?xml version="1.0" encoding="utf-8"?>
+<p:notes xmlns:a="http://schemas.openxmlformats.org/drawingml/2006/main" xmlns:r="http://schemas.openxmlformats.org/officeDocument/2006/relationships" xmlns:p="http://schemas.openxmlformats.org/presentationml/2006/main">
+  <p:cSld>
+    <p:spTree>
+      <p:nvGrpSpPr>
+        <p:cNvPr id="1" name=""/>
+        <p:cNvGrpSpPr/>
+        <p:nvPr/>
+      </p:nvGrpSpPr>
+      <p:grpSpPr>
+        <a:xfrm>
+          <a:off x="0" y="0"/>
+          <a:ext cx="0" cy="0"/>
+          <a:chOff x="0" y="0"/>
+          <a:chExt cx="0" cy="0"/>
+        </a:xfrm>
+      </p:grpSpPr>
+      <p:sp>
+        <p:nvSpPr>
+          <p:cNvPr id="2" name="Slide Image Placeholder 1"/>
+          <p:cNvSpPr>
+            <a:spLocks noGrp="1" noRot="1" noChangeAspect="1"/>
+          </p:cNvSpPr>
+          <p:nvPr>
+            <p:ph type="sldImg"/>
+          </p:nvPr>
+        </p:nvSpPr>
+        <p:spPr/>
+      </p:sp>
+      <p:sp>
+        <p:nvSpPr>
+          <p:cNvPr id="3" name="Notes Placeholder 2"/>
+          <p:cNvSpPr>
+            <a:spLocks noGrp="1"/>
+          </p:cNvSpPr>
+          <p:nvPr>
+            <p:ph type="body" idx="1"/>
+          </p:nvPr>
+        </p:nvSpPr>
+        <p:spPr/>
+        <p:txBody>
+          <a:bodyPr/>
+          <a:lstStyle/>
+          <a:p>
+            <a:r>
+              <a:rPr lang="en-US" dirty="0"/>
+              <a:t>-Jenna</a:t>
+            </a:r>
+          </a:p>
+        </p:txBody>
+      </p:sp>
+      <p:sp>
+        <p:nvSpPr>
+          <p:cNvPr id="4" name="Slide Number Placeholder 3"/>
+          <p:cNvSpPr>
+            <a:spLocks noGrp="1"/>
+          </p:cNvSpPr>
+          <p:nvPr>
+            <p:ph type="sldNum" sz="quarter" idx="5"/>
+          </p:nvPr>
+        </p:nvSpPr>
+        <p:spPr/>
+        <p:txBody>
+          <a:bodyPr/>
+          <a:lstStyle/>
+          <a:p>
+            <a:fld id="{82869989-EB00-4EE7-BCB5-25BDC5BB29F8}" type="slidenum">
+              <a:rPr lang="en-US" smtClean="0"/>
+              <a:t>8</a:t>
+            </a:fld>
+            <a:endParaRPr lang="en-US"/>
+          </a:p>
+        </p:txBody>
+      </p:sp>
+    </p:spTree>
+    <p:extLst>
+      <p:ext uri="{BB962C8B-B14F-4D97-AF65-F5344CB8AC3E}">
+        <p14:creationId xmlns:p14="http://schemas.microsoft.com/office/powerpoint/2010/main" val="4232211247"/>
+      </p:ext>
+    </p:extLst>
+  </p:cSld>
+  <p:clrMapOvr>
+    <a:masterClrMapping/>
+  </p:clrMapOvr>
+</p:notes>
+</file>
+
+<file path=ppt/notesSlides/notesSlide7.xml><?xml version="1.0" encoding="utf-8"?>
+<p:notes xmlns:a="http://schemas.openxmlformats.org/drawingml/2006/main" xmlns:r="http://schemas.openxmlformats.org/officeDocument/2006/relationships" xmlns:p="http://schemas.openxmlformats.org/presentationml/2006/main">
+  <p:cSld>
+    <p:spTree>
+      <p:nvGrpSpPr>
+        <p:cNvPr id="1" name=""/>
+        <p:cNvGrpSpPr/>
+        <p:nvPr/>
+      </p:nvGrpSpPr>
+      <p:grpSpPr>
+        <a:xfrm>
+          <a:off x="0" y="0"/>
+          <a:ext cx="0" cy="0"/>
+          <a:chOff x="0" y="0"/>
+          <a:chExt cx="0" cy="0"/>
+        </a:xfrm>
+      </p:grpSpPr>
+      <p:sp>
+        <p:nvSpPr>
+          <p:cNvPr id="2" name="Slide Image Placeholder 1"/>
+          <p:cNvSpPr>
+            <a:spLocks noGrp="1" noRot="1" noChangeAspect="1"/>
+          </p:cNvSpPr>
+          <p:nvPr>
+            <p:ph type="sldImg"/>
+          </p:nvPr>
+        </p:nvSpPr>
+        <p:spPr/>
+      </p:sp>
+      <p:sp>
+        <p:nvSpPr>
+          <p:cNvPr id="3" name="Notes Placeholder 2"/>
+          <p:cNvSpPr>
+            <a:spLocks noGrp="1"/>
+          </p:cNvSpPr>
+          <p:nvPr>
+            <p:ph type="body" idx="1"/>
+          </p:nvPr>
+        </p:nvSpPr>
+        <p:spPr/>
+        <p:txBody>
+          <a:bodyPr/>
+          <a:lstStyle/>
+          <a:p>
+            <a:r>
+              <a:rPr lang="en-US" dirty="0"/>
+              <a:t>-Jenna</a:t>
+            </a:r>
+          </a:p>
+          <a:p>
+            <a:r>
+              <a:rPr lang="en-US" dirty="0"/>
+              <a:t>-Why are equity returns so much higher than risk-free rates.</a:t>
+            </a:r>
+          </a:p>
+        </p:txBody>
+      </p:sp>
+      <p:sp>
+        <p:nvSpPr>
+          <p:cNvPr id="4" name="Slide Number Placeholder 3"/>
+          <p:cNvSpPr>
+            <a:spLocks noGrp="1"/>
+          </p:cNvSpPr>
+          <p:nvPr>
+            <p:ph type="sldNum" sz="quarter" idx="5"/>
+          </p:nvPr>
+        </p:nvSpPr>
+        <p:spPr/>
+        <p:txBody>
+          <a:bodyPr/>
+          <a:lstStyle/>
+          <a:p>
+            <a:fld id="{82869989-EB00-4EE7-BCB5-25BDC5BB29F8}" type="slidenum">
+              <a:rPr lang="en-US" smtClean="0"/>
+              <a:t>9</a:t>
+            </a:fld>
+            <a:endParaRPr lang="en-US"/>
+          </a:p>
+        </p:txBody>
+      </p:sp>
+    </p:spTree>
+    <p:extLst>
+      <p:ext uri="{BB962C8B-B14F-4D97-AF65-F5344CB8AC3E}">
+        <p14:creationId xmlns:p14="http://schemas.microsoft.com/office/powerpoint/2010/main" val="4203290343"/>
+      </p:ext>
+    </p:extLst>
+  </p:cSld>
+  <p:clrMapOvr>
+    <a:masterClrMapping/>
+  </p:clrMapOvr>
+</p:notes>
+</file>
+
+<file path=ppt/notesSlides/notesSlide8.xml><?xml version="1.0" encoding="utf-8"?>
+<p:notes xmlns:a="http://schemas.openxmlformats.org/drawingml/2006/main" xmlns:r="http://schemas.openxmlformats.org/officeDocument/2006/relationships" xmlns:p="http://schemas.openxmlformats.org/presentationml/2006/main">
+  <p:cSld>
+    <p:spTree>
+      <p:nvGrpSpPr>
+        <p:cNvPr id="1" name=""/>
+        <p:cNvGrpSpPr/>
+        <p:nvPr/>
+      </p:nvGrpSpPr>
+      <p:grpSpPr>
+        <a:xfrm>
+          <a:off x="0" y="0"/>
+          <a:ext cx="0" cy="0"/>
+          <a:chOff x="0" y="0"/>
+          <a:chExt cx="0" cy="0"/>
+        </a:xfrm>
+      </p:grpSpPr>
+      <p:sp>
+        <p:nvSpPr>
+          <p:cNvPr id="2" name="Slide Image Placeholder 1"/>
+          <p:cNvSpPr>
+            <a:spLocks noGrp="1" noRot="1" noChangeAspect="1"/>
+          </p:cNvSpPr>
+          <p:nvPr>
+            <p:ph type="sldImg"/>
+          </p:nvPr>
+        </p:nvSpPr>
+        <p:spPr/>
+      </p:sp>
+      <p:sp>
+        <p:nvSpPr>
+          <p:cNvPr id="3" name="Notes Placeholder 2"/>
+          <p:cNvSpPr>
+            <a:spLocks noGrp="1"/>
+          </p:cNvSpPr>
+          <p:nvPr>
+            <p:ph type="body" idx="1"/>
+          </p:nvPr>
+        </p:nvSpPr>
+        <p:spPr/>
+        <p:txBody>
+          <a:bodyPr/>
+          <a:lstStyle/>
+          <a:p>
+            <a:r>
+              <a:rPr lang="en-US" dirty="0"/>
+              <a:t>-Jenna</a:t>
+            </a:r>
+          </a:p>
+        </p:txBody>
+      </p:sp>
+      <p:sp>
+        <p:nvSpPr>
+          <p:cNvPr id="4" name="Slide Number Placeholder 3"/>
+          <p:cNvSpPr>
+            <a:spLocks noGrp="1"/>
+          </p:cNvSpPr>
+          <p:nvPr>
+            <p:ph type="sldNum" sz="quarter" idx="5"/>
+          </p:nvPr>
+        </p:nvSpPr>
+        <p:spPr/>
+        <p:txBody>
+          <a:bodyPr/>
+          <a:lstStyle/>
+          <a:p>
+            <a:fld id="{82869989-EB00-4EE7-BCB5-25BDC5BB29F8}" type="slidenum">
+              <a:rPr lang="en-US" smtClean="0"/>
+              <a:t>10</a:t>
+            </a:fld>
+            <a:endParaRPr lang="en-US"/>
+          </a:p>
+        </p:txBody>
+      </p:sp>
+    </p:spTree>
+    <p:extLst>
+      <p:ext uri="{BB962C8B-B14F-4D97-AF65-F5344CB8AC3E}">
+        <p14:creationId xmlns:p14="http://schemas.microsoft.com/office/powerpoint/2010/main" val="388378796"/>
+      </p:ext>
+    </p:extLst>
+  </p:cSld>
+  <p:clrMapOvr>
+    <a:masterClrMapping/>
+  </p:clrMapOvr>
+</p:notes>
+</file>
+
+<file path=ppt/notesSlides/notesSlide9.xml><?xml version="1.0" encoding="utf-8"?>
+<p:notes xmlns:a="http://schemas.openxmlformats.org/drawingml/2006/main" xmlns:r="http://schemas.openxmlformats.org/officeDocument/2006/relationships" xmlns:p="http://schemas.openxmlformats.org/presentationml/2006/main">
+  <p:cSld>
+    <p:spTree>
+      <p:nvGrpSpPr>
+        <p:cNvPr id="1" name=""/>
+        <p:cNvGrpSpPr/>
+        <p:nvPr/>
+      </p:nvGrpSpPr>
+      <p:grpSpPr>
+        <a:xfrm>
+          <a:off x="0" y="0"/>
+          <a:ext cx="0" cy="0"/>
+          <a:chOff x="0" y="0"/>
+          <a:chExt cx="0" cy="0"/>
+        </a:xfrm>
+      </p:grpSpPr>
+      <p:sp>
+        <p:nvSpPr>
+          <p:cNvPr id="2" name="Slide Image Placeholder 1"/>
+          <p:cNvSpPr>
+            <a:spLocks noGrp="1" noRot="1" noChangeAspect="1"/>
+          </p:cNvSpPr>
+          <p:nvPr>
+            <p:ph type="sldImg"/>
+          </p:nvPr>
+        </p:nvSpPr>
+        <p:spPr/>
+      </p:sp>
+      <p:sp>
+        <p:nvSpPr>
+          <p:cNvPr id="3" name="Notes Placeholder 2"/>
+          <p:cNvSpPr>
+            <a:spLocks noGrp="1"/>
+          </p:cNvSpPr>
+          <p:nvPr>
+            <p:ph type="body" idx="1"/>
+          </p:nvPr>
+        </p:nvSpPr>
+        <p:spPr/>
+        <p:txBody>
+          <a:bodyPr/>
+          <a:lstStyle/>
+          <a:p>
+            <a:r>
+              <a:rPr lang="en-US" dirty="0"/>
+              <a:t>-Jenna</a:t>
+            </a:r>
+          </a:p>
+          <a:p>
+            <a:r>
+              <a:rPr lang="en-US" dirty="0"/>
+              <a:t>-We should regulate but we cant do that if we don’t know what it is</a:t>
+            </a:r>
+          </a:p>
+        </p:txBody>
+      </p:sp>
+      <p:sp>
+        <p:nvSpPr>
+          <p:cNvPr id="4" name="Slide Number Placeholder 3"/>
+          <p:cNvSpPr>
+            <a:spLocks noGrp="1"/>
+          </p:cNvSpPr>
+          <p:nvPr>
+            <p:ph type="sldNum" sz="quarter" idx="5"/>
+          </p:nvPr>
+        </p:nvSpPr>
+        <p:spPr/>
+        <p:txBody>
+          <a:bodyPr/>
+          <a:lstStyle/>
+          <a:p>
+            <a:fld id="{82869989-EB00-4EE7-BCB5-25BDC5BB29F8}" type="slidenum">
+              <a:rPr lang="en-US" smtClean="0"/>
+              <a:t>11</a:t>
+            </a:fld>
+            <a:endParaRPr lang="en-US"/>
+          </a:p>
+        </p:txBody>
+      </p:sp>
+    </p:spTree>
+    <p:extLst>
+      <p:ext uri="{BB962C8B-B14F-4D97-AF65-F5344CB8AC3E}">
+        <p14:creationId xmlns:p14="http://schemas.microsoft.com/office/powerpoint/2010/main" val="2161136927"/>
+      </p:ext>
+    </p:extLst>
+  </p:cSld>
+  <p:clrMapOvr>
+    <a:masterClrMapping/>
+  </p:clrMapOvr>
+</p:notes>
 </file>
 
 <file path=ppt/slideLayouts/slideLayout1.xml><?xml version="1.0" encoding="utf-8"?>
@@ -2801,7 +3901,7 @@
           <a:p>
             <a:fld id="{384A29A4-78C8-47AB-BA06-22CB45938951}" type="datetime1">
               <a:rPr lang="en-US" smtClean="0"/>
-              <a:t>2/18/19</a:t>
+              <a:t>2/18/2019</a:t>
             </a:fld>
             <a:endParaRPr lang="en-US"/>
           </a:p>
@@ -2996,7 +4096,7 @@
           <a:p>
             <a:fld id="{E1ED4ACF-2D82-46F2-A8E9-23963AA34E86}" type="datetime1">
               <a:rPr lang="en-US" smtClean="0"/>
-              <a:t>2/18/19</a:t>
+              <a:t>2/18/2019</a:t>
             </a:fld>
             <a:endParaRPr lang="en-US"/>
           </a:p>
@@ -3180,7 +4280,7 @@
           <a:p>
             <a:fld id="{AE374B5B-21A0-4192-BF4C-38187F1A68D8}" type="datetime1">
               <a:rPr lang="en-US" smtClean="0"/>
-              <a:t>2/18/19</a:t>
+              <a:t>2/18/2019</a:t>
             </a:fld>
             <a:endParaRPr lang="en-US"/>
           </a:p>
@@ -5521,7 +6621,7 @@
           <a:p>
             <a:fld id="{33B5CF7C-B333-48E1-A4A6-83A3C8B73AC0}" type="datetime1">
               <a:rPr lang="en-US" smtClean="0"/>
-              <a:t>2/18/19</a:t>
+              <a:t>2/18/2019</a:t>
             </a:fld>
             <a:endParaRPr lang="en-US"/>
           </a:p>
@@ -5974,7 +7074,7 @@
           <a:p>
             <a:fld id="{AE320762-5CBF-4210-AB54-376B091119F8}" type="datetime1">
               <a:rPr lang="en-US" smtClean="0"/>
-              <a:t>2/18/19</a:t>
+              <a:t>2/18/2019</a:t>
             </a:fld>
             <a:endParaRPr lang="en-US"/>
           </a:p>
@@ -6106,7 +7206,7 @@
           <a:p>
             <a:fld id="{7F0DB371-BF5F-4058-A212-1A908E4D2674}" type="datetime1">
               <a:rPr lang="en-US" smtClean="0"/>
-              <a:t>2/18/19</a:t>
+              <a:t>2/18/2019</a:t>
             </a:fld>
             <a:endParaRPr lang="en-US"/>
           </a:p>
@@ -8039,7 +9139,7 @@
           <a:p>
             <a:fld id="{60A4083B-90AA-48CF-BAD5-00AA24D7F288}" type="datetime1">
               <a:rPr lang="en-US" smtClean="0"/>
-              <a:t>2/18/19</a:t>
+              <a:t>2/18/2019</a:t>
             </a:fld>
             <a:endParaRPr lang="en-US"/>
           </a:p>
@@ -10298,7 +11398,7 @@
             <a:fld id="{F5BAF629-ECA2-4CF3-B790-9D9BDED98269}" type="datetime1">
               <a:rPr lang="en-US" smtClean="0"/>
               <a:pPr/>
-              <a:t>2/18/19</a:t>
+              <a:t>2/18/2019</a:t>
             </a:fld>
             <a:endParaRPr lang="en-US"/>
           </a:p>
@@ -14593,7 +15693,7 @@
             <a:fld id="{B51B2453-8663-4C69-AF73-9FD7B1DEC5D0}" type="datetime1">
               <a:rPr lang="en-US" smtClean="0"/>
               <a:pPr/>
-              <a:t>2/18/19</a:t>
+              <a:t>2/18/2019</a:t>
             </a:fld>
             <a:endParaRPr lang="en-US" dirty="0"/>
           </a:p>
@@ -15090,7 +16190,7 @@
         </p:spPr>
         <p:txBody>
           <a:bodyPr>
-            <a:normAutofit lnSpcReduction="10000"/>
+            <a:normAutofit/>
           </a:bodyPr>
           <a:lstStyle/>
           <a:p>
@@ -15103,12 +16203,6 @@
             <a:r>
               <a:rPr lang="en-US" dirty="0"/>
               <a:t>ECON 4008-01: Macro Modeling </a:t>
-            </a:r>
-          </a:p>
-          <a:p>
-            <a:r>
-              <a:rPr lang="en-US" dirty="0"/>
-              <a:t>February 21, 2019</a:t>
             </a:r>
           </a:p>
           <a:p>
@@ -15243,12 +16337,8 @@
               </a:lnSpc>
             </a:pPr>
             <a:r>
-              <a:rPr lang="en-US" dirty="0" err="1"/>
-              <a:t>Mehra</a:t>
-            </a:r>
-            <a:r>
               <a:rPr lang="en-US" dirty="0"/>
-              <a:t> and Prescott’s equity premium puzzle ignited an extensive research effort within the fields of macroeconomics and finance. </a:t>
+              <a:t>Mehra and Prescott’s equity premium puzzle ignited an extensive research effort within the fields of macroeconomics and finance. </a:t>
             </a:r>
           </a:p>
           <a:p>
@@ -15370,7 +16460,7 @@
             </a:pPr>
             <a:r>
               <a:rPr lang="en-US" dirty="0"/>
-              <a:t>Are cryptocurrencies actually currencies, or are they simply assets to invest in?</a:t>
+              <a:t>Are cryptocurrencies currencies, or are they simply assets to invest in?</a:t>
             </a:r>
           </a:p>
           <a:p>
@@ -15391,12 +16481,8 @@
               </a:lnSpc>
             </a:pPr>
             <a:r>
-              <a:rPr lang="en-US" dirty="0" err="1"/>
-              <a:t>Vandezande</a:t>
-            </a:r>
-            <a:r>
               <a:rPr lang="en-US" dirty="0"/>
-              <a:t> (2017)  examines the extent to which virtual currencies are regulated in the European Union but does not perform original empirical work. </a:t>
+              <a:t>Vandezande (2017)  examines the extent to which virtual currencies are regulated in the European Union but does not perform original empirical work. </a:t>
             </a:r>
           </a:p>
           <a:p>
@@ -15621,7 +16707,7 @@
         <p:spPr/>
         <p:txBody>
           <a:bodyPr>
-            <a:normAutofit fontScale="92500"/>
+            <a:normAutofit/>
           </a:bodyPr>
           <a:lstStyle/>
           <a:p>
@@ -15632,15 +16718,7 @@
             </a:pPr>
             <a:r>
               <a:rPr lang="en-US" sz="2400" dirty="0"/>
-              <a:t>Liu and </a:t>
-            </a:r>
-            <a:r>
-              <a:rPr lang="en-US" sz="2400" dirty="0" err="1"/>
-              <a:t>Tsyvinski</a:t>
-            </a:r>
-            <a:r>
-              <a:rPr lang="en-US" sz="2400" dirty="0"/>
-              <a:t> (2018) conclude that cryptocurrencies are useful portfolio diversifiers that can be assessed using simple financial tools after examining the exposure of cryptocurrencies on to major currencies and metals. </a:t>
+              <a:t>Liu and Tsyvinski (2018) conclude that cryptocurrencies are useful portfolio diversifiers that can be assessed using simple financial tools after examining the exposure of cryptocurrencies on to major currencies and metals. </a:t>
             </a:r>
           </a:p>
           <a:p>
@@ -15651,7 +16729,7 @@
             </a:pPr>
             <a:r>
               <a:rPr lang="en-US" sz="2400" dirty="0"/>
-              <a:t>However, only cryptocurrency market specific factors including momentum and investor attention consistently explain market returns. </a:t>
+              <a:t>However, only cryptocurrency market-specific factors (momentum and investor attention) consistently explain market returns. </a:t>
             </a:r>
           </a:p>
         </p:txBody>
@@ -15756,7 +16834,15 @@
             </a:pPr>
             <a:r>
               <a:rPr lang="en-US" sz="2400" dirty="0"/>
-              <a:t>Investing in Bitcoin is significantly riskier than investing in  traditional investments, but it can be extremely profitable. </a:t>
+              <a:t>Investing in Bitcoin </a:t>
+            </a:r>
+            <a:r>
+              <a:rPr lang="el-GR" sz="2400" dirty="0"/>
+              <a:t>(β=1.00) </a:t>
+            </a:r>
+            <a:r>
+              <a:rPr lang="en-US" sz="2400" dirty="0"/>
+              <a:t>is significantly riskier than investing in  traditional investments, but it can be extremely profitable. </a:t>
             </a:r>
           </a:p>
           <a:p>
@@ -15930,15 +17016,7 @@
             </a:r>
             <a:r>
               <a:rPr lang="en-US" dirty="0"/>
-              <a:t> </a:t>
-            </a:r>
-            <a:r>
-              <a:rPr lang="en-US" dirty="0" err="1"/>
-              <a:t>Tsyvinski</a:t>
-            </a:r>
-            <a:r>
-              <a:rPr lang="en-US" dirty="0"/>
-              <a:t>. 2018. "Risks and Returns of Cryptocurrency." </a:t>
+              <a:t> Tsyvinski. 2018. "Risks and Returns of Cryptocurrency." </a:t>
             </a:r>
             <a:r>
               <a:rPr lang="en-US" i="1" dirty="0"/>
@@ -15966,15 +17044,7 @@
           <a:p>
             <a:r>
               <a:rPr lang="en-US" dirty="0"/>
-              <a:t>Prescott, Edward, and Rajnish </a:t>
-            </a:r>
-            <a:r>
-              <a:rPr lang="en-US" dirty="0" err="1"/>
-              <a:t>Mehra</a:t>
-            </a:r>
-            <a:r>
-              <a:rPr lang="en-US" dirty="0"/>
-              <a:t>. 1985. "The equity premium: A puzzle." </a:t>
+              <a:t>Prescott, Edward, and Rajnish Mehra. 1985. "The equity premium: A puzzle." </a:t>
             </a:r>
             <a:r>
               <a:rPr lang="en-US" i="1" dirty="0"/>
@@ -15987,12 +17057,8 @@
           </a:p>
           <a:p>
             <a:r>
-              <a:rPr lang="en-US" dirty="0" err="1"/>
-              <a:t>Vandezande</a:t>
-            </a:r>
-            <a:r>
               <a:rPr lang="en-US" dirty="0"/>
-              <a:t>, Niels. 2017. "Virtual currencies under EU anti-money laundering law." </a:t>
+              <a:t>Vandezande, Niels. 2017. "Virtual currencies under EU anti-money laundering law." </a:t>
             </a:r>
             <a:r>
               <a:rPr lang="en-US" i="1" dirty="0"/>
@@ -16245,7 +17311,7 @@
             </a:pPr>
             <a:r>
               <a:rPr lang="en-US" sz="2400" dirty="0"/>
-              <a:t>What is the shock process of Bitcoin and the shock process of a relatively risk free U.S. Treasury Bill? </a:t>
+              <a:t>What is the shock process of Bitcoin and the shock process of a relatively risk-free U.S. Treasury Bill? </a:t>
             </a:r>
           </a:p>
           <a:p>
@@ -16489,7 +17555,7 @@
             </a:pPr>
             <a:r>
               <a:rPr lang="en-US" dirty="0"/>
-              <a:t>Its market performance includes steep increases and precipitous declines in value further suggesting the market is driven by the expectations of investors and spectators. </a:t>
+              <a:t>Bitcoin’s market performance includes steep increases and precipitous declines in value which suggest that the market is driven by the expectations of investors and spectators. </a:t>
             </a:r>
           </a:p>
           <a:p>
@@ -16512,15 +17578,15 @@
           <p:nvPr/>
         </p:nvPicPr>
         <p:blipFill>
-          <a:blip r:embed="rId2"/>
+          <a:blip r:embed="rId3"/>
           <a:stretch>
             <a:fillRect/>
           </a:stretch>
         </p:blipFill>
         <p:spPr>
           <a:xfrm>
-            <a:off x="3198963" y="3175323"/>
-            <a:ext cx="6388381" cy="2518895"/>
+            <a:off x="3491344" y="3257366"/>
+            <a:ext cx="6648536" cy="2625726"/>
           </a:xfrm>
           <a:prstGeom prst="rect">
             <a:avLst/>
@@ -16823,7 +17889,7 @@
             </a:pPr>
             <a:r>
               <a:rPr lang="en-US" sz="2400" dirty="0"/>
-              <a:t>Traditionally, studies examine the excess returns of a risky security or index relative to those of risk free assets or treasury bonds. </a:t>
+              <a:t>Traditionally, studies examine the excess returns of a risky security or index, relative to the returns of risk-free assets or treasury bonds. </a:t>
             </a:r>
           </a:p>
           <a:p>
@@ -16834,7 +17900,7 @@
             </a:pPr>
             <a:r>
               <a:rPr lang="en-US" sz="2400" dirty="0"/>
-              <a:t>It is unsurprising that cryptocurrencies are volatile and associated with large returns and losses. </a:t>
+              <a:t>It is not surprising that cryptocurrencies are volatile and associated with large returns and losses. </a:t>
             </a:r>
           </a:p>
           <a:p>
@@ -16977,17 +18043,6 @@
               <a:t>His paper first examines the behavior of asset prices in a one-good pure exchange economy with identical consumers and introduces a method of constructing equilibrium prices. </a:t>
             </a:r>
           </a:p>
-          <a:p>
-            <a:pPr>
-              <a:lnSpc>
-                <a:spcPct val="150000"/>
-              </a:lnSpc>
-            </a:pPr>
-            <a:r>
-              <a:rPr lang="en-US" dirty="0"/>
-              <a:t>Fruit Tree Analogy</a:t>
-            </a:r>
-          </a:p>
         </p:txBody>
       </p:sp>
     </p:spTree>
@@ -17124,10 +18179,10 @@
           <p:nvPr/>
         </p:nvPicPr>
         <p:blipFill>
-          <a:blip r:embed="rId2">
+          <a:blip r:embed="rId3">
             <a:extLst>
               <a:ext uri="{837473B0-CC2E-450A-ABE3-18F120FF3D39}">
-                <a1611:picAttrSrcUrl xmlns:a1611="http://schemas.microsoft.com/office/drawing/2016/11/main" r:id="rId3"/>
+                <a1611:picAttrSrcUrl xmlns:a1611="http://schemas.microsoft.com/office/drawing/2016/11/main" r:id="rId4"/>
               </a:ext>
             </a:extLst>
           </a:blip>
@@ -17175,7 +18230,7 @@
           <a:p>
             <a:r>
               <a:rPr lang="en-US" sz="900">
-                <a:hlinkClick r:id="rId3" tooltip="https://hbdchick.wordpress.com/2012/09/18/and-now-for-something-else-completely-different-2/"/>
+                <a:hlinkClick r:id="rId4" tooltip="https://hbdchick.wordpress.com/2012/09/18/and-now-for-something-else-completely-different-2/"/>
               </a:rPr>
               <a:t>This Photo</a:t>
             </a:r>
@@ -17185,7 +18240,7 @@
             </a:r>
             <a:r>
               <a:rPr lang="en-US" sz="900">
-                <a:hlinkClick r:id="rId4" tooltip="https://creativecommons.org/licenses/by/3.0/"/>
+                <a:hlinkClick r:id="rId5" tooltip="https://creativecommons.org/licenses/by/3.0/"/>
               </a:rPr>
               <a:t>CC BY</a:t>
             </a:r>
@@ -17293,15 +18348,7 @@
             </a:pPr>
             <a:r>
               <a:rPr lang="en-US" dirty="0"/>
-              <a:t>Prescott and </a:t>
-            </a:r>
-            <a:r>
-              <a:rPr lang="en-US" dirty="0" err="1"/>
-              <a:t>Mehra</a:t>
-            </a:r>
-            <a:r>
-              <a:rPr lang="en-US" dirty="0"/>
-              <a:t> (1985) employ a version of Lucas’ model and find that returns of equity exceed the returns of T-Bills </a:t>
+              <a:t>Prescott and Mehra (1985) employ a version of Lucas’ model and find that returns of equity exceed the returns of T-Bills </a:t>
             </a:r>
           </a:p>
           <a:p>

</xml_diff>